<commit_message>
add new theta plot
</commit_message>
<xml_diff>
--- a/2021_05-thesis_commitee_meeting/2021.05.07_thesis_committee_meeting.pptx
+++ b/2021_05-thesis_commitee_meeting/2021.05.07_thesis_committee_meeting.pptx
@@ -125,6 +125,11 @@
       </a:defRPr>
     </a:lvl9pPr>
   </p:defaultTextStyle>
+  <p:extLst>
+    <p:ext uri="{EFAFB233-063F-42B5-8137-9DF3F51BA10A}">
+      <p15:sldGuideLst xmlns:p15="http://schemas.microsoft.com/office/powerpoint/2012/main"/>
+    </p:ext>
+  </p:extLst>
 </p:presentation>
 </file>
 
@@ -210,7 +215,7 @@
           <a:p>
             <a:fld id="{68B12822-C163-5442-8146-B5F20BB242F8}" type="datetimeFigureOut">
               <a:rPr lang="en-US" smtClean="0"/>
-              <a:t>5/5/21</a:t>
+              <a:t>5/6/21</a:t>
             </a:fld>
             <a:endParaRPr lang="en-US"/>
           </a:p>
@@ -608,7 +613,7 @@
           <a:p>
             <a:fld id="{922E339E-0200-6944-94FF-2611EDCA0E53}" type="datetimeFigureOut">
               <a:rPr lang="en-US" smtClean="0"/>
-              <a:t>5/5/21</a:t>
+              <a:t>5/6/21</a:t>
             </a:fld>
             <a:endParaRPr lang="en-US"/>
           </a:p>
@@ -778,7 +783,7 @@
           <a:p>
             <a:fld id="{922E339E-0200-6944-94FF-2611EDCA0E53}" type="datetimeFigureOut">
               <a:rPr lang="en-US" smtClean="0"/>
-              <a:t>5/5/21</a:t>
+              <a:t>5/6/21</a:t>
             </a:fld>
             <a:endParaRPr lang="en-US"/>
           </a:p>
@@ -958,7 +963,7 @@
           <a:p>
             <a:fld id="{922E339E-0200-6944-94FF-2611EDCA0E53}" type="datetimeFigureOut">
               <a:rPr lang="en-US" smtClean="0"/>
-              <a:t>5/5/21</a:t>
+              <a:t>5/6/21</a:t>
             </a:fld>
             <a:endParaRPr lang="en-US"/>
           </a:p>
@@ -1128,7 +1133,7 @@
           <a:p>
             <a:fld id="{922E339E-0200-6944-94FF-2611EDCA0E53}" type="datetimeFigureOut">
               <a:rPr lang="en-US" smtClean="0"/>
-              <a:t>5/5/21</a:t>
+              <a:t>5/6/21</a:t>
             </a:fld>
             <a:endParaRPr lang="en-US"/>
           </a:p>
@@ -1374,7 +1379,7 @@
           <a:p>
             <a:fld id="{922E339E-0200-6944-94FF-2611EDCA0E53}" type="datetimeFigureOut">
               <a:rPr lang="en-US" smtClean="0"/>
-              <a:t>5/5/21</a:t>
+              <a:t>5/6/21</a:t>
             </a:fld>
             <a:endParaRPr lang="en-US"/>
           </a:p>
@@ -1606,7 +1611,7 @@
           <a:p>
             <a:fld id="{922E339E-0200-6944-94FF-2611EDCA0E53}" type="datetimeFigureOut">
               <a:rPr lang="en-US" smtClean="0"/>
-              <a:t>5/5/21</a:t>
+              <a:t>5/6/21</a:t>
             </a:fld>
             <a:endParaRPr lang="en-US"/>
           </a:p>
@@ -1973,7 +1978,7 @@
           <a:p>
             <a:fld id="{922E339E-0200-6944-94FF-2611EDCA0E53}" type="datetimeFigureOut">
               <a:rPr lang="en-US" smtClean="0"/>
-              <a:t>5/5/21</a:t>
+              <a:t>5/6/21</a:t>
             </a:fld>
             <a:endParaRPr lang="en-US"/>
           </a:p>
@@ -2091,7 +2096,7 @@
           <a:p>
             <a:fld id="{922E339E-0200-6944-94FF-2611EDCA0E53}" type="datetimeFigureOut">
               <a:rPr lang="en-US" smtClean="0"/>
-              <a:t>5/5/21</a:t>
+              <a:t>5/6/21</a:t>
             </a:fld>
             <a:endParaRPr lang="en-US"/>
           </a:p>
@@ -2186,7 +2191,7 @@
           <a:p>
             <a:fld id="{922E339E-0200-6944-94FF-2611EDCA0E53}" type="datetimeFigureOut">
               <a:rPr lang="en-US" smtClean="0"/>
-              <a:t>5/5/21</a:t>
+              <a:t>5/6/21</a:t>
             </a:fld>
             <a:endParaRPr lang="en-US"/>
           </a:p>
@@ -2463,7 +2468,7 @@
           <a:p>
             <a:fld id="{922E339E-0200-6944-94FF-2611EDCA0E53}" type="datetimeFigureOut">
               <a:rPr lang="en-US" smtClean="0"/>
-              <a:t>5/5/21</a:t>
+              <a:t>5/6/21</a:t>
             </a:fld>
             <a:endParaRPr lang="en-US"/>
           </a:p>
@@ -2720,7 +2725,7 @@
           <a:p>
             <a:fld id="{922E339E-0200-6944-94FF-2611EDCA0E53}" type="datetimeFigureOut">
               <a:rPr lang="en-US" smtClean="0"/>
-              <a:t>5/5/21</a:t>
+              <a:t>5/6/21</a:t>
             </a:fld>
             <a:endParaRPr lang="en-US"/>
           </a:p>
@@ -2933,7 +2938,7 @@
           <a:p>
             <a:fld id="{922E339E-0200-6944-94FF-2611EDCA0E53}" type="datetimeFigureOut">
               <a:rPr lang="en-US" smtClean="0"/>
-              <a:t>5/5/21</a:t>
+              <a:t>5/6/21</a:t>
             </a:fld>
             <a:endParaRPr lang="en-US"/>
           </a:p>
@@ -4515,15 +4520,6 @@
               <a:srgbClr val="FFFFFF"/>
             </a:contourClr>
           </a:sp3d>
-          <a:extLst>
-            <a:ext uri="{909E8E84-426E-40DD-AFC4-6F175D3DCCD1}">
-              <a14:hiddenFill xmlns:a14="http://schemas.microsoft.com/office/drawing/2010/main">
-                <a:solidFill>
-                  <a:srgbClr val="FFFFFF"/>
-                </a:solidFill>
-              </a14:hiddenFill>
-            </a:ext>
-          </a:extLst>
         </p:spPr>
       </p:pic>
       <p:pic>
@@ -4591,15 +4587,6 @@
               <a:srgbClr val="FFFFFF"/>
             </a:contourClr>
           </a:sp3d>
-          <a:extLst>
-            <a:ext uri="{909E8E84-426E-40DD-AFC4-6F175D3DCCD1}">
-              <a14:hiddenFill xmlns:a14="http://schemas.microsoft.com/office/drawing/2010/main">
-                <a:solidFill>
-                  <a:srgbClr val="FFFFFF"/>
-                </a:solidFill>
-              </a14:hiddenFill>
-            </a:ext>
-          </a:extLst>
         </p:spPr>
       </p:pic>
       <p:sp>
@@ -5862,7 +5849,9 @@
           </a:xfrm>
         </p:spPr>
         <p:txBody>
-          <a:bodyPr/>
+          <a:bodyPr>
+            <a:normAutofit lnSpcReduction="10000"/>
+          </a:bodyPr>
           <a:lstStyle/>
           <a:p>
             <a:pPr marL="514350" indent="-514350">
@@ -11967,7 +11956,15 @@
           <a:p>
             <a:r>
               <a:rPr lang="en-US" dirty="0"/>
-              <a:t>Aim #2: Trial runs (while working on genome)</a:t>
+              <a:t>Aim #2: Preliminary result (w new </a:t>
+            </a:r>
+            <a:r>
+              <a:rPr lang="en-US" dirty="0" err="1"/>
+              <a:t>asm</a:t>
+            </a:r>
+            <a:r>
+              <a:rPr lang="en-US" dirty="0"/>
+              <a:t>)</a:t>
             </a:r>
           </a:p>
         </p:txBody>
@@ -11998,6 +11995,12 @@
               <a:t>historical</a:t>
             </a:r>
           </a:p>
+          <a:p>
+            <a:r>
+              <a:rPr lang="en-US" dirty="0"/>
+              <a:t>needs further filtering</a:t>
+            </a:r>
+          </a:p>
         </p:txBody>
       </p:sp>
       <p:sp>
@@ -12086,10 +12089,10 @@
       </p:sp>
       <p:pic>
         <p:nvPicPr>
-          <p:cNvPr id="7" name="Content Placeholder 8">
+          <p:cNvPr id="8" name="Picture 7">
             <a:extLst>
               <a:ext uri="{FF2B5EF4-FFF2-40B4-BE49-F238E27FC236}">
-                <a16:creationId xmlns:a16="http://schemas.microsoft.com/office/drawing/2014/main" id="{F1FED8EF-D915-FE4F-A39F-83ED701D12E8}"/>
+                <a16:creationId xmlns:a16="http://schemas.microsoft.com/office/drawing/2014/main" id="{919EC480-4978-6E43-AAAF-0FB19EA797C9}"/>
               </a:ext>
             </a:extLst>
           </p:cNvPr>
@@ -12106,8 +12109,8 @@
         </p:blipFill>
         <p:spPr>
           <a:xfrm>
-            <a:off x="2435085" y="2525197"/>
-            <a:ext cx="6943382" cy="3857435"/>
+            <a:off x="4906010" y="1690688"/>
+            <a:ext cx="5751830" cy="4702443"/>
           </a:xfrm>
           <a:prstGeom prst="rect">
             <a:avLst/>
@@ -12167,7 +12170,15 @@
           <a:p>
             <a:r>
               <a:rPr lang="en-US" dirty="0"/>
-              <a:t>Aim #2: Trial runs (while working on genome)</a:t>
+              <a:t>Aim #2: Trial run (used previous RAD </a:t>
+            </a:r>
+            <a:r>
+              <a:rPr lang="en-US" dirty="0" err="1"/>
+              <a:t>asm</a:t>
+            </a:r>
+            <a:r>
+              <a:rPr lang="en-US" dirty="0"/>
+              <a:t>)</a:t>
             </a:r>
           </a:p>
         </p:txBody>
@@ -12188,7 +12199,12 @@
             <p:ph idx="1"/>
           </p:nvPr>
         </p:nvSpPr>
-        <p:spPr/>
+        <p:spPr>
+          <a:xfrm>
+            <a:off x="838200" y="1825625"/>
+            <a:ext cx="2746733" cy="4351338"/>
+          </a:xfrm>
+        </p:spPr>
         <p:txBody>
           <a:bodyPr/>
           <a:lstStyle/>
@@ -12196,6 +12212,12 @@
             <a:r>
               <a:rPr lang="en-US" dirty="0"/>
               <a:t>contemporary</a:t>
+            </a:r>
+          </a:p>
+          <a:p>
+            <a:r>
+              <a:rPr lang="en-US" dirty="0"/>
+              <a:t>rerunning using new genome</a:t>
             </a:r>
           </a:p>
         </p:txBody>

</xml_diff>

<commit_message>
make theta tables the same & report theta/BP
</commit_message>
<xml_diff>
--- a/2021_05-thesis_commitee_meeting/2021.05.07_thesis_committee_meeting.pptx
+++ b/2021_05-thesis_commitee_meeting/2021.05.07_thesis_committee_meeting.pptx
@@ -15,9 +15,9 @@
     <p:sldId id="259" r:id="rId6"/>
     <p:sldId id="267" r:id="rId7"/>
     <p:sldId id="260" r:id="rId8"/>
-    <p:sldId id="262" r:id="rId9"/>
-    <p:sldId id="269" r:id="rId10"/>
-    <p:sldId id="270" r:id="rId11"/>
+    <p:sldId id="281" r:id="rId9"/>
+    <p:sldId id="262" r:id="rId10"/>
+    <p:sldId id="269" r:id="rId11"/>
     <p:sldId id="271" r:id="rId12"/>
     <p:sldId id="264" r:id="rId13"/>
     <p:sldId id="263" r:id="rId14"/>
@@ -215,7 +215,7 @@
           <a:p>
             <a:fld id="{68B12822-C163-5442-8146-B5F20BB242F8}" type="datetimeFigureOut">
               <a:rPr lang="en-US" smtClean="0"/>
-              <a:t>5/6/21</a:t>
+              <a:t>5/7/21</a:t>
             </a:fld>
             <a:endParaRPr lang="en-US"/>
           </a:p>
@@ -482,6 +482,727 @@
 </p:notesMaster>
 </file>
 
+<file path=ppt/notesSlides/notesSlide1.xml><?xml version="1.0" encoding="utf-8"?>
+<p:notes xmlns:a="http://schemas.openxmlformats.org/drawingml/2006/main" xmlns:r="http://schemas.openxmlformats.org/officeDocument/2006/relationships" xmlns:p="http://schemas.openxmlformats.org/presentationml/2006/main">
+  <p:cSld>
+    <p:spTree>
+      <p:nvGrpSpPr>
+        <p:cNvPr id="1" name=""/>
+        <p:cNvGrpSpPr/>
+        <p:nvPr/>
+      </p:nvGrpSpPr>
+      <p:grpSpPr>
+        <a:xfrm>
+          <a:off x="0" y="0"/>
+          <a:ext cx="0" cy="0"/>
+          <a:chOff x="0" y="0"/>
+          <a:chExt cx="0" cy="0"/>
+        </a:xfrm>
+      </p:grpSpPr>
+      <p:sp>
+        <p:nvSpPr>
+          <p:cNvPr id="2" name="Slide Image Placeholder 1"/>
+          <p:cNvSpPr>
+            <a:spLocks noGrp="1" noRot="1" noChangeAspect="1"/>
+          </p:cNvSpPr>
+          <p:nvPr>
+            <p:ph type="sldImg"/>
+          </p:nvPr>
+        </p:nvSpPr>
+        <p:spPr/>
+      </p:sp>
+      <p:sp>
+        <p:nvSpPr>
+          <p:cNvPr id="3" name="Notes Placeholder 2"/>
+          <p:cNvSpPr>
+            <a:spLocks noGrp="1"/>
+          </p:cNvSpPr>
+          <p:nvPr>
+            <p:ph type="body" idx="1"/>
+          </p:nvPr>
+        </p:nvSpPr>
+        <p:spPr/>
+        <p:txBody>
+          <a:bodyPr/>
+          <a:lstStyle/>
+          <a:p>
+            <a:r>
+              <a:rPr lang="en-US" dirty="0"/>
+              <a:t>First off I want to thank you all for meeting today. Me and my thesis work feel really appreciative there was a time that worked for everyone. I want to give everyone an update on my thesis work. I have about twenty slides and am primarily looking for feedback on my last aim. So while of course feel free to interrupt me, also please leave a little time for discussing my last aim. </a:t>
+            </a:r>
+            <a:r>
+              <a:rPr lang="en-US" dirty="0" err="1"/>
+              <a:t>YOu</a:t>
+            </a:r>
+            <a:r>
+              <a:rPr lang="en-US" dirty="0"/>
+              <a:t> all have been in many more thesis meetings than I have so let me know if that format isn't consistent with their point.</a:t>
+            </a:r>
+          </a:p>
+          <a:p>
+            <a:r>
+              <a:rPr lang="en-US" dirty="0"/>
+              <a:t>Also, I believe I've let all of you know individually but I applied to a position as Yosemite National Park's Wildlife Data Manager and got the position. woo </a:t>
+            </a:r>
+            <a:r>
+              <a:rPr lang="en-US" dirty="0" err="1"/>
+              <a:t>hoo</a:t>
+            </a:r>
+            <a:r>
+              <a:rPr lang="en-US" dirty="0"/>
+              <a:t>! I will be starting that position in July and will be working part time towards finishing my degree from then on.</a:t>
+            </a:r>
+          </a:p>
+          <a:p>
+            <a:r>
+              <a:rPr lang="en-US" dirty="0"/>
+              <a:t>Anyways, onto my research––I think all of you know by now but just in case any interactions that you've had with me has been wiped from your memory I've been working on the genome assembly and investigation of the delta smelt genome for estimates of effective population size and identification of sex-specific markers.</a:t>
+            </a:r>
+          </a:p>
+        </p:txBody>
+      </p:sp>
+      <p:sp>
+        <p:nvSpPr>
+          <p:cNvPr id="4" name="Slide Number Placeholder 3"/>
+          <p:cNvSpPr>
+            <a:spLocks noGrp="1"/>
+          </p:cNvSpPr>
+          <p:nvPr>
+            <p:ph type="sldNum" sz="quarter" idx="5"/>
+          </p:nvPr>
+        </p:nvSpPr>
+        <p:spPr/>
+        <p:txBody>
+          <a:bodyPr/>
+          <a:lstStyle/>
+          <a:p>
+            <a:fld id="{5F48E31E-76D7-6D44-8982-2FD8532DD924}" type="slidenum">
+              <a:rPr lang="en-US" smtClean="0"/>
+              <a:t>1</a:t>
+            </a:fld>
+            <a:endParaRPr lang="en-US"/>
+          </a:p>
+        </p:txBody>
+      </p:sp>
+    </p:spTree>
+    <p:extLst>
+      <p:ext uri="{BB962C8B-B14F-4D97-AF65-F5344CB8AC3E}">
+        <p14:creationId xmlns:p14="http://schemas.microsoft.com/office/powerpoint/2010/main" val="2024338451"/>
+      </p:ext>
+    </p:extLst>
+  </p:cSld>
+  <p:clrMapOvr>
+    <a:masterClrMapping/>
+  </p:clrMapOvr>
+</p:notes>
+</file>
+
+<file path=ppt/notesSlides/notesSlide2.xml><?xml version="1.0" encoding="utf-8"?>
+<p:notes xmlns:a="http://schemas.openxmlformats.org/drawingml/2006/main" xmlns:r="http://schemas.openxmlformats.org/officeDocument/2006/relationships" xmlns:p="http://schemas.openxmlformats.org/presentationml/2006/main">
+  <p:cSld>
+    <p:spTree>
+      <p:nvGrpSpPr>
+        <p:cNvPr id="1" name=""/>
+        <p:cNvGrpSpPr/>
+        <p:nvPr/>
+      </p:nvGrpSpPr>
+      <p:grpSpPr>
+        <a:xfrm>
+          <a:off x="0" y="0"/>
+          <a:ext cx="0" cy="0"/>
+          <a:chOff x="0" y="0"/>
+          <a:chExt cx="0" cy="0"/>
+        </a:xfrm>
+      </p:grpSpPr>
+      <p:sp>
+        <p:nvSpPr>
+          <p:cNvPr id="2" name="Slide Image Placeholder 1"/>
+          <p:cNvSpPr>
+            <a:spLocks noGrp="1" noRot="1" noChangeAspect="1"/>
+          </p:cNvSpPr>
+          <p:nvPr>
+            <p:ph type="sldImg"/>
+          </p:nvPr>
+        </p:nvSpPr>
+        <p:spPr/>
+      </p:sp>
+      <p:sp>
+        <p:nvSpPr>
+          <p:cNvPr id="3" name="Notes Placeholder 2"/>
+          <p:cNvSpPr>
+            <a:spLocks noGrp="1"/>
+          </p:cNvSpPr>
+          <p:nvPr>
+            <p:ph type="body" idx="1"/>
+          </p:nvPr>
+        </p:nvSpPr>
+        <p:spPr/>
+        <p:txBody>
+          <a:bodyPr/>
+          <a:lstStyle/>
+          <a:p>
+            <a:r>
+              <a:rPr lang="en-US" dirty="0"/>
+              <a:t>My first aim is to produce a high-quality reference genome for delta smelt</a:t>
+            </a:r>
+          </a:p>
+          <a:p>
+            <a:r>
+              <a:rPr lang="en-US" dirty="0"/>
+              <a:t>My second aim is to estimate contemporary and historical effective population size using temporal data from roughly 25 generation of delta smelt.</a:t>
+            </a:r>
+          </a:p>
+          <a:p>
+            <a:r>
+              <a:rPr lang="en-US" dirty="0"/>
+              <a:t>My third and last aim is to identify sex-specific markers that can be used to non-invasively (aka genetically) sex wild and captive delta smelt. This is the topic that I'm hoping to glean some advice for</a:t>
+            </a:r>
+          </a:p>
+        </p:txBody>
+      </p:sp>
+      <p:sp>
+        <p:nvSpPr>
+          <p:cNvPr id="4" name="Slide Number Placeholder 3"/>
+          <p:cNvSpPr>
+            <a:spLocks noGrp="1"/>
+          </p:cNvSpPr>
+          <p:nvPr>
+            <p:ph type="sldNum" sz="quarter" idx="5"/>
+          </p:nvPr>
+        </p:nvSpPr>
+        <p:spPr/>
+        <p:txBody>
+          <a:bodyPr/>
+          <a:lstStyle/>
+          <a:p>
+            <a:fld id="{5F48E31E-76D7-6D44-8982-2FD8532DD924}" type="slidenum">
+              <a:rPr lang="en-US" smtClean="0"/>
+              <a:t>2</a:t>
+            </a:fld>
+            <a:endParaRPr lang="en-US"/>
+          </a:p>
+        </p:txBody>
+      </p:sp>
+    </p:spTree>
+    <p:extLst>
+      <p:ext uri="{BB962C8B-B14F-4D97-AF65-F5344CB8AC3E}">
+        <p14:creationId xmlns:p14="http://schemas.microsoft.com/office/powerpoint/2010/main" val="1959229964"/>
+      </p:ext>
+    </p:extLst>
+  </p:cSld>
+  <p:clrMapOvr>
+    <a:masterClrMapping/>
+  </p:clrMapOvr>
+</p:notes>
+</file>
+
+<file path=ppt/notesSlides/notesSlide3.xml><?xml version="1.0" encoding="utf-8"?>
+<p:notes xmlns:a="http://schemas.openxmlformats.org/drawingml/2006/main" xmlns:r="http://schemas.openxmlformats.org/officeDocument/2006/relationships" xmlns:p="http://schemas.openxmlformats.org/presentationml/2006/main">
+  <p:cSld>
+    <p:spTree>
+      <p:nvGrpSpPr>
+        <p:cNvPr id="1" name=""/>
+        <p:cNvGrpSpPr/>
+        <p:nvPr/>
+      </p:nvGrpSpPr>
+      <p:grpSpPr>
+        <a:xfrm>
+          <a:off x="0" y="0"/>
+          <a:ext cx="0" cy="0"/>
+          <a:chOff x="0" y="0"/>
+          <a:chExt cx="0" cy="0"/>
+        </a:xfrm>
+      </p:grpSpPr>
+      <p:sp>
+        <p:nvSpPr>
+          <p:cNvPr id="2" name="Slide Image Placeholder 1"/>
+          <p:cNvSpPr>
+            <a:spLocks noGrp="1" noRot="1" noChangeAspect="1"/>
+          </p:cNvSpPr>
+          <p:nvPr>
+            <p:ph type="sldImg"/>
+          </p:nvPr>
+        </p:nvSpPr>
+        <p:spPr/>
+      </p:sp>
+      <p:sp>
+        <p:nvSpPr>
+          <p:cNvPr id="3" name="Notes Placeholder 2"/>
+          <p:cNvSpPr>
+            <a:spLocks noGrp="1"/>
+          </p:cNvSpPr>
+          <p:nvPr>
+            <p:ph type="body" idx="1"/>
+          </p:nvPr>
+        </p:nvSpPr>
+        <p:spPr/>
+        <p:txBody>
+          <a:bodyPr/>
+          <a:lstStyle/>
+          <a:p>
+            <a:r>
+              <a:rPr lang="en-US" dirty="0"/>
+              <a:t>For my first aim I carried out two hybrid assemblies one with a female and one with a male delta smelt. originally I was intending to only used 10X Genomics linked-read sequencing and Phase Genomics hi-c but I struck a bit of luck and the price of </a:t>
+            </a:r>
+            <a:r>
+              <a:rPr lang="en-US" dirty="0" err="1"/>
+              <a:t>pacbio</a:t>
+            </a:r>
+            <a:r>
+              <a:rPr lang="en-US" dirty="0"/>
+              <a:t> sequencing dropped dramatically a few years ago, we recovered the loci sequences from a linkage map study by Lew et al 2015 and I was able to collaborate with the Delaney lab to karyotype delta smelt for a non-sequence based chromosome number. count</a:t>
+            </a:r>
+          </a:p>
+        </p:txBody>
+      </p:sp>
+      <p:sp>
+        <p:nvSpPr>
+          <p:cNvPr id="4" name="Slide Number Placeholder 3"/>
+          <p:cNvSpPr>
+            <a:spLocks noGrp="1"/>
+          </p:cNvSpPr>
+          <p:nvPr>
+            <p:ph type="sldNum" sz="quarter" idx="5"/>
+          </p:nvPr>
+        </p:nvSpPr>
+        <p:spPr/>
+        <p:txBody>
+          <a:bodyPr/>
+          <a:lstStyle/>
+          <a:p>
+            <a:fld id="{5F48E31E-76D7-6D44-8982-2FD8532DD924}" type="slidenum">
+              <a:rPr lang="en-US" smtClean="0"/>
+              <a:t>3</a:t>
+            </a:fld>
+            <a:endParaRPr lang="en-US"/>
+          </a:p>
+        </p:txBody>
+      </p:sp>
+    </p:spTree>
+    <p:extLst>
+      <p:ext uri="{BB962C8B-B14F-4D97-AF65-F5344CB8AC3E}">
+        <p14:creationId xmlns:p14="http://schemas.microsoft.com/office/powerpoint/2010/main" val="2480127237"/>
+      </p:ext>
+    </p:extLst>
+  </p:cSld>
+  <p:clrMapOvr>
+    <a:masterClrMapping/>
+  </p:clrMapOvr>
+</p:notes>
+</file>
+
+<file path=ppt/notesSlides/notesSlide4.xml><?xml version="1.0" encoding="utf-8"?>
+<p:notes xmlns:a="http://schemas.openxmlformats.org/drawingml/2006/main" xmlns:r="http://schemas.openxmlformats.org/officeDocument/2006/relationships" xmlns:p="http://schemas.openxmlformats.org/presentationml/2006/main">
+  <p:cSld>
+    <p:spTree>
+      <p:nvGrpSpPr>
+        <p:cNvPr id="1" name=""/>
+        <p:cNvGrpSpPr/>
+        <p:nvPr/>
+      </p:nvGrpSpPr>
+      <p:grpSpPr>
+        <a:xfrm>
+          <a:off x="0" y="0"/>
+          <a:ext cx="0" cy="0"/>
+          <a:chOff x="0" y="0"/>
+          <a:chExt cx="0" cy="0"/>
+        </a:xfrm>
+      </p:grpSpPr>
+      <p:sp>
+        <p:nvSpPr>
+          <p:cNvPr id="2" name="Slide Image Placeholder 1"/>
+          <p:cNvSpPr>
+            <a:spLocks noGrp="1" noRot="1" noChangeAspect="1"/>
+          </p:cNvSpPr>
+          <p:nvPr>
+            <p:ph type="sldImg"/>
+          </p:nvPr>
+        </p:nvSpPr>
+        <p:spPr/>
+      </p:sp>
+      <p:sp>
+        <p:nvSpPr>
+          <p:cNvPr id="3" name="Notes Placeholder 2"/>
+          <p:cNvSpPr>
+            <a:spLocks noGrp="1"/>
+          </p:cNvSpPr>
+          <p:nvPr>
+            <p:ph type="body" idx="1"/>
+          </p:nvPr>
+        </p:nvSpPr>
+        <p:spPr/>
+        <p:txBody>
+          <a:bodyPr/>
+          <a:lstStyle/>
+          <a:p>
+            <a:r>
+              <a:rPr lang="en-US" dirty="0"/>
+              <a:t>We ran two separate experiments to karyotype the fish. The first ended up being a bit of a trial run to get the process of selecting and processing individuals. We used juvenile fish that were about 100 days post hatch. Upon dissection we sex the fish and separated the head kidney (which would have cells dividing at a rapid rate) into male and female pools. Unfortunately, we didn't find many cells with usable chromosomes were suspended at the correct step of mitosis and this was the best image we captured. It does tell us 2n=56 but cannot give any further information like chromosome composition or tell if there is the presence of a sex chromosome.</a:t>
+            </a:r>
+          </a:p>
+        </p:txBody>
+      </p:sp>
+      <p:sp>
+        <p:nvSpPr>
+          <p:cNvPr id="4" name="Slide Number Placeholder 3"/>
+          <p:cNvSpPr>
+            <a:spLocks noGrp="1"/>
+          </p:cNvSpPr>
+          <p:nvPr>
+            <p:ph type="sldNum" sz="quarter" idx="5"/>
+          </p:nvPr>
+        </p:nvSpPr>
+        <p:spPr/>
+        <p:txBody>
+          <a:bodyPr/>
+          <a:lstStyle/>
+          <a:p>
+            <a:fld id="{5F48E31E-76D7-6D44-8982-2FD8532DD924}" type="slidenum">
+              <a:rPr lang="en-US" smtClean="0"/>
+              <a:t>4</a:t>
+            </a:fld>
+            <a:endParaRPr lang="en-US"/>
+          </a:p>
+        </p:txBody>
+      </p:sp>
+    </p:spTree>
+    <p:extLst>
+      <p:ext uri="{BB962C8B-B14F-4D97-AF65-F5344CB8AC3E}">
+        <p14:creationId xmlns:p14="http://schemas.microsoft.com/office/powerpoint/2010/main" val="3702518392"/>
+      </p:ext>
+    </p:extLst>
+  </p:cSld>
+  <p:clrMapOvr>
+    <a:masterClrMapping/>
+  </p:clrMapOvr>
+</p:notes>
+</file>
+
+<file path=ppt/notesSlides/notesSlide5.xml><?xml version="1.0" encoding="utf-8"?>
+<p:notes xmlns:a="http://schemas.openxmlformats.org/drawingml/2006/main" xmlns:r="http://schemas.openxmlformats.org/officeDocument/2006/relationships" xmlns:p="http://schemas.openxmlformats.org/presentationml/2006/main">
+  <p:cSld>
+    <p:spTree>
+      <p:nvGrpSpPr>
+        <p:cNvPr id="1" name=""/>
+        <p:cNvGrpSpPr/>
+        <p:nvPr/>
+      </p:nvGrpSpPr>
+      <p:grpSpPr>
+        <a:xfrm>
+          <a:off x="0" y="0"/>
+          <a:ext cx="0" cy="0"/>
+          <a:chOff x="0" y="0"/>
+          <a:chExt cx="0" cy="0"/>
+        </a:xfrm>
+      </p:grpSpPr>
+      <p:sp>
+        <p:nvSpPr>
+          <p:cNvPr id="2" name="Slide Image Placeholder 1"/>
+          <p:cNvSpPr>
+            <a:spLocks noGrp="1" noRot="1" noChangeAspect="1"/>
+          </p:cNvSpPr>
+          <p:nvPr>
+            <p:ph type="sldImg"/>
+          </p:nvPr>
+        </p:nvSpPr>
+        <p:spPr/>
+      </p:sp>
+      <p:sp>
+        <p:nvSpPr>
+          <p:cNvPr id="3" name="Notes Placeholder 2"/>
+          <p:cNvSpPr>
+            <a:spLocks noGrp="1"/>
+          </p:cNvSpPr>
+          <p:nvPr>
+            <p:ph type="body" idx="1"/>
+          </p:nvPr>
+        </p:nvSpPr>
+        <p:spPr/>
+        <p:txBody>
+          <a:bodyPr/>
+          <a:lstStyle/>
+          <a:p>
+            <a:r>
+              <a:rPr lang="en-US" dirty="0"/>
+              <a:t>While the karyotyping study was happening I was also working to assemble the genome of delta smelt. This slide gives a rough idea of the steps I took to complete the assemblies. </a:t>
+            </a:r>
+          </a:p>
+          <a:p>
+            <a:r>
+              <a:rPr lang="en-US" dirty="0"/>
+              <a:t>First, I sampled the fish and either brought the tissues samples to the DNA Technologies Core for extraction and sequencing, or shipped them to Phase for extraction and hi-c sequencing.</a:t>
+            </a:r>
+          </a:p>
+          <a:p>
+            <a:r>
+              <a:rPr lang="en-US" dirty="0"/>
+              <a:t>Once I received the long-read sequencing data I ran a primary assembly using just the long reads. </a:t>
+            </a:r>
+          </a:p>
+          <a:p>
+            <a:r>
+              <a:rPr lang="en-US" dirty="0"/>
+              <a:t>I then purged the assembly of duplicated </a:t>
+            </a:r>
+            <a:r>
+              <a:rPr lang="en-US" dirty="0" err="1"/>
+              <a:t>haplotigs</a:t>
+            </a:r>
+            <a:r>
+              <a:rPr lang="en-US" dirty="0"/>
+              <a:t> and scaffolded the assembly using the long-range information from the linked-reads.</a:t>
+            </a:r>
+          </a:p>
+          <a:p>
+            <a:r>
+              <a:rPr lang="en-US" dirty="0"/>
+              <a:t>I then further </a:t>
+            </a:r>
+            <a:r>
+              <a:rPr lang="en-US" dirty="0" err="1"/>
+              <a:t>scaffoled</a:t>
+            </a:r>
+            <a:r>
+              <a:rPr lang="en-US" dirty="0"/>
+              <a:t> the linked and long read assembly using the ultra long-range information from the hi-c data. </a:t>
+            </a:r>
+          </a:p>
+          <a:p>
+            <a:r>
+              <a:rPr lang="en-US" dirty="0"/>
+              <a:t>After, I used the linkage map loci to anchor the by now very large scaffolds into chromosome level scaffolds.</a:t>
+            </a:r>
+          </a:p>
+          <a:p>
+            <a:r>
+              <a:rPr lang="en-US" dirty="0"/>
+              <a:t>The BUSCO statistics of the male and female assemblies were fairly comparable. But female assembly has air parenthesis better N50 and L50 statistics while the male assembly length is slightly longer. This could be due to the presence of a male chromosome but alas, perhaps let's hold off on this until aim 3.</a:t>
+            </a:r>
+          </a:p>
+        </p:txBody>
+      </p:sp>
+      <p:sp>
+        <p:nvSpPr>
+          <p:cNvPr id="4" name="Slide Number Placeholder 3"/>
+          <p:cNvSpPr>
+            <a:spLocks noGrp="1"/>
+          </p:cNvSpPr>
+          <p:nvPr>
+            <p:ph type="sldNum" sz="quarter" idx="5"/>
+          </p:nvPr>
+        </p:nvSpPr>
+        <p:spPr/>
+        <p:txBody>
+          <a:bodyPr/>
+          <a:lstStyle/>
+          <a:p>
+            <a:fld id="{5F48E31E-76D7-6D44-8982-2FD8532DD924}" type="slidenum">
+              <a:rPr lang="en-US" smtClean="0"/>
+              <a:t>5</a:t>
+            </a:fld>
+            <a:endParaRPr lang="en-US"/>
+          </a:p>
+        </p:txBody>
+      </p:sp>
+    </p:spTree>
+    <p:extLst>
+      <p:ext uri="{BB962C8B-B14F-4D97-AF65-F5344CB8AC3E}">
+        <p14:creationId xmlns:p14="http://schemas.microsoft.com/office/powerpoint/2010/main" val="3217975177"/>
+      </p:ext>
+    </p:extLst>
+  </p:cSld>
+  <p:clrMapOvr>
+    <a:masterClrMapping/>
+  </p:clrMapOvr>
+</p:notes>
+</file>
+
+<file path=ppt/notesSlides/notesSlide6.xml><?xml version="1.0" encoding="utf-8"?>
+<p:notes xmlns:a="http://schemas.openxmlformats.org/drawingml/2006/main" xmlns:r="http://schemas.openxmlformats.org/officeDocument/2006/relationships" xmlns:p="http://schemas.openxmlformats.org/presentationml/2006/main">
+  <p:cSld>
+    <p:spTree>
+      <p:nvGrpSpPr>
+        <p:cNvPr id="1" name=""/>
+        <p:cNvGrpSpPr/>
+        <p:nvPr/>
+      </p:nvGrpSpPr>
+      <p:grpSpPr>
+        <a:xfrm>
+          <a:off x="0" y="0"/>
+          <a:ext cx="0" cy="0"/>
+          <a:chOff x="0" y="0"/>
+          <a:chExt cx="0" cy="0"/>
+        </a:xfrm>
+      </p:grpSpPr>
+      <p:sp>
+        <p:nvSpPr>
+          <p:cNvPr id="2" name="Slide Image Placeholder 1"/>
+          <p:cNvSpPr>
+            <a:spLocks noGrp="1" noRot="1" noChangeAspect="1"/>
+          </p:cNvSpPr>
+          <p:nvPr>
+            <p:ph type="sldImg"/>
+          </p:nvPr>
+        </p:nvSpPr>
+        <p:spPr/>
+      </p:sp>
+      <p:sp>
+        <p:nvSpPr>
+          <p:cNvPr id="3" name="Notes Placeholder 2"/>
+          <p:cNvSpPr>
+            <a:spLocks noGrp="1"/>
+          </p:cNvSpPr>
+          <p:nvPr>
+            <p:ph type="body" idx="1"/>
+          </p:nvPr>
+        </p:nvSpPr>
+        <p:spPr/>
+        <p:txBody>
+          <a:bodyPr/>
+          <a:lstStyle/>
+          <a:p>
+            <a:r>
+              <a:rPr lang="en-US" dirty="0"/>
+              <a:t>Next I will be manually curating the assembly according to a newly published paper from Howe et al (2021) which has many members of the Vertebrate Genome Project on the author line and has been useful in bettering or finalizing their assemblies.</a:t>
+            </a:r>
+          </a:p>
+          <a:p>
+            <a:r>
+              <a:rPr lang="en-US" dirty="0"/>
+              <a:t>Once I clean up the assemblies a bit I will upload them to NCBI</a:t>
+            </a:r>
+          </a:p>
+          <a:p>
+            <a:r>
+              <a:rPr lang="en-US" dirty="0"/>
+              <a:t>Then write everything up.</a:t>
+            </a:r>
+          </a:p>
+        </p:txBody>
+      </p:sp>
+      <p:sp>
+        <p:nvSpPr>
+          <p:cNvPr id="4" name="Slide Number Placeholder 3"/>
+          <p:cNvSpPr>
+            <a:spLocks noGrp="1"/>
+          </p:cNvSpPr>
+          <p:nvPr>
+            <p:ph type="sldNum" sz="quarter" idx="5"/>
+          </p:nvPr>
+        </p:nvSpPr>
+        <p:spPr/>
+        <p:txBody>
+          <a:bodyPr/>
+          <a:lstStyle/>
+          <a:p>
+            <a:fld id="{5F48E31E-76D7-6D44-8982-2FD8532DD924}" type="slidenum">
+              <a:rPr lang="en-US" smtClean="0"/>
+              <a:t>6</a:t>
+            </a:fld>
+            <a:endParaRPr lang="en-US"/>
+          </a:p>
+        </p:txBody>
+      </p:sp>
+    </p:spTree>
+    <p:extLst>
+      <p:ext uri="{BB962C8B-B14F-4D97-AF65-F5344CB8AC3E}">
+        <p14:creationId xmlns:p14="http://schemas.microsoft.com/office/powerpoint/2010/main" val="2851574461"/>
+      </p:ext>
+    </p:extLst>
+  </p:cSld>
+  <p:clrMapOvr>
+    <a:masterClrMapping/>
+  </p:clrMapOvr>
+</p:notes>
+</file>
+
+<file path=ppt/notesSlides/notesSlide7.xml><?xml version="1.0" encoding="utf-8"?>
+<p:notes xmlns:a="http://schemas.openxmlformats.org/drawingml/2006/main" xmlns:r="http://schemas.openxmlformats.org/officeDocument/2006/relationships" xmlns:p="http://schemas.openxmlformats.org/presentationml/2006/main">
+  <p:cSld>
+    <p:spTree>
+      <p:nvGrpSpPr>
+        <p:cNvPr id="1" name=""/>
+        <p:cNvGrpSpPr/>
+        <p:nvPr/>
+      </p:nvGrpSpPr>
+      <p:grpSpPr>
+        <a:xfrm>
+          <a:off x="0" y="0"/>
+          <a:ext cx="0" cy="0"/>
+          <a:chOff x="0" y="0"/>
+          <a:chExt cx="0" cy="0"/>
+        </a:xfrm>
+      </p:grpSpPr>
+      <p:sp>
+        <p:nvSpPr>
+          <p:cNvPr id="2" name="Slide Image Placeholder 1"/>
+          <p:cNvSpPr>
+            <a:spLocks noGrp="1" noRot="1" noChangeAspect="1"/>
+          </p:cNvSpPr>
+          <p:nvPr>
+            <p:ph type="sldImg"/>
+          </p:nvPr>
+        </p:nvSpPr>
+        <p:spPr/>
+      </p:sp>
+      <p:sp>
+        <p:nvSpPr>
+          <p:cNvPr id="3" name="Notes Placeholder 2"/>
+          <p:cNvSpPr>
+            <a:spLocks noGrp="1"/>
+          </p:cNvSpPr>
+          <p:nvPr>
+            <p:ph type="body" idx="1"/>
+          </p:nvPr>
+        </p:nvSpPr>
+        <p:spPr/>
+        <p:txBody>
+          <a:bodyPr/>
+          <a:lstStyle/>
+          <a:p>
+            <a:r>
+              <a:rPr lang="en-US" dirty="0"/>
+              <a:t>For my second aim of inferring the effective population size of delta smelt, I ran a preliminary analysis while I was carrying out the genome assembly. The dataset for this portion of my project consists of 2945 individuals spanning about 25 birth years. As a reminder delta smelt have an annual life cycle so each years also corresponds to a different generation. My initial analysis estimated historical and contemporary Ne using a de novo RAD-sequencing based "reference assembly".</a:t>
+            </a:r>
+          </a:p>
+        </p:txBody>
+      </p:sp>
+      <p:sp>
+        <p:nvSpPr>
+          <p:cNvPr id="4" name="Slide Number Placeholder 3"/>
+          <p:cNvSpPr>
+            <a:spLocks noGrp="1"/>
+          </p:cNvSpPr>
+          <p:nvPr>
+            <p:ph type="sldNum" sz="quarter" idx="5"/>
+          </p:nvPr>
+        </p:nvSpPr>
+        <p:spPr/>
+        <p:txBody>
+          <a:bodyPr/>
+          <a:lstStyle/>
+          <a:p>
+            <a:fld id="{5F48E31E-76D7-6D44-8982-2FD8532DD924}" type="slidenum">
+              <a:rPr lang="en-US" smtClean="0"/>
+              <a:t>7</a:t>
+            </a:fld>
+            <a:endParaRPr lang="en-US"/>
+          </a:p>
+        </p:txBody>
+      </p:sp>
+    </p:spTree>
+    <p:extLst>
+      <p:ext uri="{BB962C8B-B14F-4D97-AF65-F5344CB8AC3E}">
+        <p14:creationId xmlns:p14="http://schemas.microsoft.com/office/powerpoint/2010/main" val="999912405"/>
+      </p:ext>
+    </p:extLst>
+  </p:cSld>
+  <p:clrMapOvr>
+    <a:masterClrMapping/>
+  </p:clrMapOvr>
+</p:notes>
+</file>
+
 <file path=ppt/slideLayouts/slideLayout1.xml><?xml version="1.0" encoding="utf-8"?>
 <p:sldLayout xmlns:a="http://schemas.openxmlformats.org/drawingml/2006/main" xmlns:r="http://schemas.openxmlformats.org/officeDocument/2006/relationships" xmlns:p="http://schemas.openxmlformats.org/presentationml/2006/main" type="title" preserve="1">
   <p:cSld name="Title Slide">
@@ -613,7 +1334,7 @@
           <a:p>
             <a:fld id="{922E339E-0200-6944-94FF-2611EDCA0E53}" type="datetimeFigureOut">
               <a:rPr lang="en-US" smtClean="0"/>
-              <a:t>5/6/21</a:t>
+              <a:t>5/7/21</a:t>
             </a:fld>
             <a:endParaRPr lang="en-US"/>
           </a:p>
@@ -783,7 +1504,7 @@
           <a:p>
             <a:fld id="{922E339E-0200-6944-94FF-2611EDCA0E53}" type="datetimeFigureOut">
               <a:rPr lang="en-US" smtClean="0"/>
-              <a:t>5/6/21</a:t>
+              <a:t>5/7/21</a:t>
             </a:fld>
             <a:endParaRPr lang="en-US"/>
           </a:p>
@@ -963,7 +1684,7 @@
           <a:p>
             <a:fld id="{922E339E-0200-6944-94FF-2611EDCA0E53}" type="datetimeFigureOut">
               <a:rPr lang="en-US" smtClean="0"/>
-              <a:t>5/6/21</a:t>
+              <a:t>5/7/21</a:t>
             </a:fld>
             <a:endParaRPr lang="en-US"/>
           </a:p>
@@ -1133,7 +1854,7 @@
           <a:p>
             <a:fld id="{922E339E-0200-6944-94FF-2611EDCA0E53}" type="datetimeFigureOut">
               <a:rPr lang="en-US" smtClean="0"/>
-              <a:t>5/6/21</a:t>
+              <a:t>5/7/21</a:t>
             </a:fld>
             <a:endParaRPr lang="en-US"/>
           </a:p>
@@ -1379,7 +2100,7 @@
           <a:p>
             <a:fld id="{922E339E-0200-6944-94FF-2611EDCA0E53}" type="datetimeFigureOut">
               <a:rPr lang="en-US" smtClean="0"/>
-              <a:t>5/6/21</a:t>
+              <a:t>5/7/21</a:t>
             </a:fld>
             <a:endParaRPr lang="en-US"/>
           </a:p>
@@ -1611,7 +2332,7 @@
           <a:p>
             <a:fld id="{922E339E-0200-6944-94FF-2611EDCA0E53}" type="datetimeFigureOut">
               <a:rPr lang="en-US" smtClean="0"/>
-              <a:t>5/6/21</a:t>
+              <a:t>5/7/21</a:t>
             </a:fld>
             <a:endParaRPr lang="en-US"/>
           </a:p>
@@ -1978,7 +2699,7 @@
           <a:p>
             <a:fld id="{922E339E-0200-6944-94FF-2611EDCA0E53}" type="datetimeFigureOut">
               <a:rPr lang="en-US" smtClean="0"/>
-              <a:t>5/6/21</a:t>
+              <a:t>5/7/21</a:t>
             </a:fld>
             <a:endParaRPr lang="en-US"/>
           </a:p>
@@ -2096,7 +2817,7 @@
           <a:p>
             <a:fld id="{922E339E-0200-6944-94FF-2611EDCA0E53}" type="datetimeFigureOut">
               <a:rPr lang="en-US" smtClean="0"/>
-              <a:t>5/6/21</a:t>
+              <a:t>5/7/21</a:t>
             </a:fld>
             <a:endParaRPr lang="en-US"/>
           </a:p>
@@ -2191,7 +2912,7 @@
           <a:p>
             <a:fld id="{922E339E-0200-6944-94FF-2611EDCA0E53}" type="datetimeFigureOut">
               <a:rPr lang="en-US" smtClean="0"/>
-              <a:t>5/6/21</a:t>
+              <a:t>5/7/21</a:t>
             </a:fld>
             <a:endParaRPr lang="en-US"/>
           </a:p>
@@ -2468,7 +3189,7 @@
           <a:p>
             <a:fld id="{922E339E-0200-6944-94FF-2611EDCA0E53}" type="datetimeFigureOut">
               <a:rPr lang="en-US" smtClean="0"/>
-              <a:t>5/6/21</a:t>
+              <a:t>5/7/21</a:t>
             </a:fld>
             <a:endParaRPr lang="en-US"/>
           </a:p>
@@ -2725,7 +3446,7 @@
           <a:p>
             <a:fld id="{922E339E-0200-6944-94FF-2611EDCA0E53}" type="datetimeFigureOut">
               <a:rPr lang="en-US" smtClean="0"/>
-              <a:t>5/6/21</a:t>
+              <a:t>5/7/21</a:t>
             </a:fld>
             <a:endParaRPr lang="en-US"/>
           </a:p>
@@ -2938,7 +3659,7 @@
           <a:p>
             <a:fld id="{922E339E-0200-6944-94FF-2611EDCA0E53}" type="datetimeFigureOut">
               <a:rPr lang="en-US" smtClean="0"/>
-              <a:t>5/6/21</a:t>
+              <a:t>5/7/21</a:t>
             </a:fld>
             <a:endParaRPr lang="en-US"/>
           </a:p>
@@ -3446,6 +4167,28 @@
               <a:t>07 May 2021</a:t>
             </a:r>
           </a:p>
+          <a:p>
+            <a:r>
+              <a:rPr lang="en-US" sz="1100" dirty="0"/>
+              <a:t>(https://</a:t>
+            </a:r>
+            <a:r>
+              <a:rPr lang="en-US" sz="1100" dirty="0" err="1"/>
+              <a:t>github.com</a:t>
+            </a:r>
+            <a:r>
+              <a:rPr lang="en-US" sz="1100" dirty="0"/>
+              <a:t>/</a:t>
+            </a:r>
+            <a:r>
+              <a:rPr lang="en-US" sz="1100" dirty="0" err="1"/>
+              <a:t>shannonekj</a:t>
+            </a:r>
+            <a:r>
+              <a:rPr lang="en-US" sz="1100" dirty="0"/>
+              <a:t>/presentations/tree/master/2021_05-thesis_commitee_meeting)</a:t>
+            </a:r>
+          </a:p>
         </p:txBody>
       </p:sp>
     </p:spTree>
@@ -3501,7 +4244,15 @@
           <a:p>
             <a:r>
               <a:rPr lang="en-US" dirty="0"/>
-              <a:t>Aim #2: Trial runs (while working on genome)</a:t>
+              <a:t>Aim #2: Trial run (used previous RAD </a:t>
+            </a:r>
+            <a:r>
+              <a:rPr lang="en-US" dirty="0" err="1"/>
+              <a:t>asm</a:t>
+            </a:r>
+            <a:r>
+              <a:rPr lang="en-US" dirty="0"/>
+              <a:t>)</a:t>
             </a:r>
           </a:p>
         </p:txBody>
@@ -3522,7 +4273,12 @@
             <p:ph idx="1"/>
           </p:nvPr>
         </p:nvSpPr>
-        <p:spPr/>
+        <p:spPr>
+          <a:xfrm>
+            <a:off x="838200" y="1825625"/>
+            <a:ext cx="2746733" cy="4351338"/>
+          </a:xfrm>
+        </p:spPr>
         <p:txBody>
           <a:bodyPr/>
           <a:lstStyle/>
@@ -3530,6 +4286,26 @@
             <a:r>
               <a:rPr lang="en-US" dirty="0"/>
               <a:t>contemporary</a:t>
+            </a:r>
+          </a:p>
+          <a:p>
+            <a:r>
+              <a:rPr lang="en-US" dirty="0"/>
+              <a:t>used </a:t>
+            </a:r>
+            <a:r>
+              <a:rPr lang="en-US" dirty="0" err="1"/>
+              <a:t>RADseq</a:t>
+            </a:r>
+            <a:r>
+              <a:rPr lang="en-US" dirty="0"/>
+              <a:t> based reference assembly</a:t>
+            </a:r>
+          </a:p>
+          <a:p>
+            <a:r>
+              <a:rPr lang="en-US" dirty="0"/>
+              <a:t>rerunning using new genome</a:t>
             </a:r>
           </a:p>
         </p:txBody>
@@ -3651,7 +4427,7 @@
     </p:spTree>
     <p:extLst>
       <p:ext uri="{BB962C8B-B14F-4D97-AF65-F5344CB8AC3E}">
-        <p14:creationId xmlns:p14="http://schemas.microsoft.com/office/powerpoint/2010/main" val="3266661183"/>
+        <p14:creationId xmlns:p14="http://schemas.microsoft.com/office/powerpoint/2010/main" val="3590740312"/>
       </p:ext>
     </p:extLst>
   </p:cSld>
@@ -6314,7 +7090,7 @@
           <a:p>
             <a:r>
               <a:rPr lang="en-US" dirty="0"/>
-              <a:t>Aims</a:t>
+              <a:t>Overview</a:t>
             </a:r>
           </a:p>
         </p:txBody>
@@ -7187,7 +7963,7 @@
           <p:nvPr/>
         </p:nvPicPr>
         <p:blipFill>
-          <a:blip r:embed="rId2"/>
+          <a:blip r:embed="rId3"/>
           <a:stretch>
             <a:fillRect/>
           </a:stretch>
@@ -11956,15 +12732,7 @@
           <a:p>
             <a:r>
               <a:rPr lang="en-US" dirty="0"/>
-              <a:t>Aim #2: Preliminary result (w new </a:t>
-            </a:r>
-            <a:r>
-              <a:rPr lang="en-US" dirty="0" err="1"/>
-              <a:t>asm</a:t>
-            </a:r>
-            <a:r>
-              <a:rPr lang="en-US" dirty="0"/>
-              <a:t>)</a:t>
+              <a:t>Aim #2: Trial run</a:t>
             </a:r>
           </a:p>
         </p:txBody>
@@ -11985,7 +12753,12 @@
             <p:ph idx="1"/>
           </p:nvPr>
         </p:nvSpPr>
-        <p:spPr/>
+        <p:spPr>
+          <a:xfrm>
+            <a:off x="838200" y="1825625"/>
+            <a:ext cx="3382108" cy="4351338"/>
+          </a:xfrm>
+        </p:spPr>
         <p:txBody>
           <a:bodyPr/>
           <a:lstStyle/>
@@ -11998,7 +12771,15 @@
           <a:p>
             <a:r>
               <a:rPr lang="en-US" dirty="0"/>
-              <a:t>needs further filtering</a:t>
+              <a:t>used </a:t>
+            </a:r>
+            <a:r>
+              <a:rPr lang="en-US" dirty="0" err="1"/>
+              <a:t>RADseq</a:t>
+            </a:r>
+            <a:r>
+              <a:rPr lang="en-US" dirty="0"/>
+              <a:t> based reference assembly</a:t>
             </a:r>
           </a:p>
         </p:txBody>
@@ -12092,7 +12873,7 @@
           <p:cNvPr id="8" name="Picture 7">
             <a:extLst>
               <a:ext uri="{FF2B5EF4-FFF2-40B4-BE49-F238E27FC236}">
-                <a16:creationId xmlns:a16="http://schemas.microsoft.com/office/drawing/2014/main" id="{919EC480-4978-6E43-AAAF-0FB19EA797C9}"/>
+                <a16:creationId xmlns:a16="http://schemas.microsoft.com/office/drawing/2014/main" id="{D6EFE975-799C-514C-88B7-55C8A2A12E20}"/>
               </a:ext>
             </a:extLst>
           </p:cNvPr>
@@ -12109,8 +12890,8 @@
         </p:blipFill>
         <p:spPr>
           <a:xfrm>
-            <a:off x="4906010" y="1690688"/>
-            <a:ext cx="5751830" cy="4702443"/>
+            <a:off x="4407984" y="1680326"/>
+            <a:ext cx="7127420" cy="4496637"/>
           </a:xfrm>
           <a:prstGeom prst="rect">
             <a:avLst/>
@@ -12120,7 +12901,7 @@
     </p:spTree>
     <p:extLst>
       <p:ext uri="{BB962C8B-B14F-4D97-AF65-F5344CB8AC3E}">
-        <p14:creationId xmlns:p14="http://schemas.microsoft.com/office/powerpoint/2010/main" val="1801292182"/>
+        <p14:creationId xmlns:p14="http://schemas.microsoft.com/office/powerpoint/2010/main" val="1976715996"/>
       </p:ext>
     </p:extLst>
   </p:cSld>
@@ -12170,7 +12951,7 @@
           <a:p>
             <a:r>
               <a:rPr lang="en-US" dirty="0"/>
-              <a:t>Aim #2: Trial run (used previous RAD </a:t>
+              <a:t>Aim #2: Preliminary result (w new </a:t>
             </a:r>
             <a:r>
               <a:rPr lang="en-US" dirty="0" err="1"/>
@@ -12199,25 +12980,20 @@
             <p:ph idx="1"/>
           </p:nvPr>
         </p:nvSpPr>
-        <p:spPr>
-          <a:xfrm>
-            <a:off x="838200" y="1825625"/>
-            <a:ext cx="2746733" cy="4351338"/>
-          </a:xfrm>
-        </p:spPr>
+        <p:spPr/>
         <p:txBody>
           <a:bodyPr/>
           <a:lstStyle/>
           <a:p>
             <a:r>
               <a:rPr lang="en-US" dirty="0"/>
-              <a:t>contemporary</a:t>
+              <a:t>historical</a:t>
             </a:r>
           </a:p>
           <a:p>
             <a:r>
               <a:rPr lang="en-US" dirty="0"/>
-              <a:t>rerunning using new genome</a:t>
+              <a:t>needs further filtering</a:t>
             </a:r>
           </a:p>
         </p:txBody>
@@ -12308,10 +13084,10 @@
       </p:sp>
       <p:pic>
         <p:nvPicPr>
-          <p:cNvPr id="6" name="Content Placeholder 27">
+          <p:cNvPr id="8" name="Picture 7">
             <a:extLst>
               <a:ext uri="{FF2B5EF4-FFF2-40B4-BE49-F238E27FC236}">
-                <a16:creationId xmlns:a16="http://schemas.microsoft.com/office/drawing/2014/main" id="{0793E010-0B18-BB4D-A9D1-0A39295A1C9B}"/>
+                <a16:creationId xmlns:a16="http://schemas.microsoft.com/office/drawing/2014/main" id="{12076132-D616-A14A-BD03-2798255ECB30}"/>
               </a:ext>
             </a:extLst>
           </p:cNvPr>
@@ -12328,8 +13104,38 @@
         </p:blipFill>
         <p:spPr>
           <a:xfrm>
-            <a:off x="3584933" y="1449194"/>
-            <a:ext cx="7902595" cy="5268398"/>
+            <a:off x="4407984" y="1680326"/>
+            <a:ext cx="7127421" cy="4496637"/>
+          </a:xfrm>
+          <a:prstGeom prst="rect">
+            <a:avLst/>
+          </a:prstGeom>
+        </p:spPr>
+      </p:pic>
+      <p:pic>
+        <p:nvPicPr>
+          <p:cNvPr id="10" name="Picture 9">
+            <a:extLst>
+              <a:ext uri="{FF2B5EF4-FFF2-40B4-BE49-F238E27FC236}">
+                <a16:creationId xmlns:a16="http://schemas.microsoft.com/office/drawing/2014/main" id="{3F19D725-F438-A647-B3BE-520D0EB5394B}"/>
+              </a:ext>
+            </a:extLst>
+          </p:cNvPr>
+          <p:cNvPicPr>
+            <a:picLocks noChangeAspect="1"/>
+          </p:cNvPicPr>
+          <p:nvPr/>
+        </p:nvPicPr>
+        <p:blipFill>
+          <a:blip r:embed="rId3"/>
+          <a:stretch>
+            <a:fillRect/>
+          </a:stretch>
+        </p:blipFill>
+        <p:spPr>
+          <a:xfrm>
+            <a:off x="4407984" y="1680326"/>
+            <a:ext cx="7127420" cy="4496637"/>
           </a:xfrm>
           <a:prstGeom prst="rect">
             <a:avLst/>
@@ -12339,7 +13145,7 @@
     </p:spTree>
     <p:extLst>
       <p:ext uri="{BB962C8B-B14F-4D97-AF65-F5344CB8AC3E}">
-        <p14:creationId xmlns:p14="http://schemas.microsoft.com/office/powerpoint/2010/main" val="3590740312"/>
+        <p14:creationId xmlns:p14="http://schemas.microsoft.com/office/powerpoint/2010/main" val="1801292182"/>
       </p:ext>
     </p:extLst>
   </p:cSld>

</xml_diff>